<commit_message>
Updated 2-t module with video
</commit_message>
<xml_diff>
--- a/modules/2_Sample_t/PPT.pptx
+++ b/modules/2_Sample_t/PPT.pptx
@@ -3895,21 +3895,25 @@
           <a:p>
             <a:r>
               <a:rPr lang="en-US" dirty="0" smtClean="0"/>
-              <a:t>Do </a:t>
+              <a:t>Do mean </a:t>
             </a:r>
             <a:r>
               <a:rPr lang="en-US" dirty="0"/>
-              <a:t>test scores differ between sections of a class?</a:t>
+              <a:t>test scores differ between </a:t>
+            </a:r>
+            <a:r>
+              <a:rPr lang="en-US" dirty="0" smtClean="0"/>
+              <a:t>two sections </a:t>
+            </a:r>
+            <a:r>
+              <a:rPr lang="en-US" dirty="0"/>
+              <a:t>of a class?</a:t>
             </a:r>
           </a:p>
           <a:p>
             <a:r>
               <a:rPr lang="en-US" dirty="0" smtClean="0"/>
-              <a:t>Doe</a:t>
-            </a:r>
-            <a:r>
-              <a:rPr lang="en-US" dirty="0" smtClean="0"/>
-              <a:t>s </a:t>
+              <a:t>Does </a:t>
             </a:r>
             <a:r>
               <a:rPr lang="en-US" dirty="0"/>
@@ -3935,7 +3939,15 @@
           <a:p>
             <a:r>
               <a:rPr lang="en-US" dirty="0"/>
-              <a:t>Does the time from ingesting a pill until a subject claims no more headache pain less for subjects given an experimental drug as compared to those given a placebo?</a:t>
+              <a:t>Does the </a:t>
+            </a:r>
+            <a:r>
+              <a:rPr lang="en-US" dirty="0" smtClean="0"/>
+              <a:t>average time </a:t>
+            </a:r>
+            <a:r>
+              <a:rPr lang="en-US" dirty="0"/>
+              <a:t>from ingesting a pill until a subject claims no more headache pain less for subjects given an experimental drug as compared to those given a placebo?</a:t>
             </a:r>
           </a:p>
         </p:txBody>
@@ -3950,7 +3962,7 @@
         </p:nvSpPr>
         <p:spPr bwMode="auto">
           <a:xfrm>
-            <a:off x="76200" y="5334000"/>
+            <a:off x="76200" y="5638800"/>
             <a:ext cx="9067800" cy="1143000"/>
           </a:xfrm>
           <a:prstGeom prst="rect">
@@ -4139,9 +4151,80 @@
   <p:timing>
     <p:tnLst>
       <p:par>
-        <p:cTn id="1" dur="indefinite" restart="never" nodeType="tmRoot"/>
+        <p:cTn id="1" dur="indefinite" restart="never" nodeType="tmRoot">
+          <p:childTnLst>
+            <p:seq concurrent="1" nextAc="seek">
+              <p:cTn id="2" dur="indefinite" nodeType="mainSeq">
+                <p:childTnLst>
+                  <p:par>
+                    <p:cTn id="3" fill="hold">
+                      <p:stCondLst>
+                        <p:cond delay="indefinite"/>
+                      </p:stCondLst>
+                      <p:childTnLst>
+                        <p:par>
+                          <p:cTn id="4" fill="hold">
+                            <p:stCondLst>
+                              <p:cond delay="0"/>
+                            </p:stCondLst>
+                            <p:childTnLst>
+                              <p:par>
+                                <p:cTn id="5" presetID="1" presetClass="entr" presetSubtype="0" fill="hold" grpId="0" nodeType="clickEffect">
+                                  <p:stCondLst>
+                                    <p:cond delay="0"/>
+                                  </p:stCondLst>
+                                  <p:childTnLst>
+                                    <p:set>
+                                      <p:cBhvr>
+                                        <p:cTn id="6" dur="1" fill="hold">
+                                          <p:stCondLst>
+                                            <p:cond delay="0"/>
+                                          </p:stCondLst>
+                                        </p:cTn>
+                                        <p:tgtEl>
+                                          <p:spTgt spid="6"/>
+                                        </p:tgtEl>
+                                        <p:attrNameLst>
+                                          <p:attrName>style.visibility</p:attrName>
+                                        </p:attrNameLst>
+                                      </p:cBhvr>
+                                      <p:to>
+                                        <p:strVal val="visible"/>
+                                      </p:to>
+                                    </p:set>
+                                  </p:childTnLst>
+                                </p:cTn>
+                              </p:par>
+                            </p:childTnLst>
+                          </p:cTn>
+                        </p:par>
+                      </p:childTnLst>
+                    </p:cTn>
+                  </p:par>
+                </p:childTnLst>
+              </p:cTn>
+              <p:prevCondLst>
+                <p:cond evt="onPrev" delay="0">
+                  <p:tgtEl>
+                    <p:sldTgt/>
+                  </p:tgtEl>
+                </p:cond>
+              </p:prevCondLst>
+              <p:nextCondLst>
+                <p:cond evt="onNext" delay="0">
+                  <p:tgtEl>
+                    <p:sldTgt/>
+                  </p:tgtEl>
+                </p:cond>
+              </p:nextCondLst>
+            </p:seq>
+          </p:childTnLst>
+        </p:cTn>
       </p:par>
     </p:tnLst>
+    <p:bldLst>
+      <p:bldP spid="6" grpId="0"/>
+    </p:bldLst>
   </p:timing>
 </p:sld>
 </file>
@@ -4275,11 +4358,7 @@
             </a:r>
             <a:r>
               <a:rPr lang="en-US" sz="2400" b="1" dirty="0" smtClean="0"/>
-              <a:t>assumption(s</a:t>
-            </a:r>
-            <a:r>
-              <a:rPr lang="en-US" sz="2400" b="1" dirty="0" smtClean="0"/>
-              <a:t>)  [</a:t>
+              <a:t>assumption(s)  [</a:t>
             </a:r>
             <a:r>
               <a:rPr lang="en-US" sz="2400" b="1" dirty="0" err="1" smtClean="0"/>
@@ -4968,7 +5047,7 @@
           <a:graphicData uri="http://schemas.openxmlformats.org/presentationml/2006/ole">
             <mc:AlternateContent xmlns:mc="http://schemas.openxmlformats.org/markup-compatibility/2006">
               <mc:Choice xmlns:v="urn:schemas-microsoft-com:vml" Requires="v">
-                <p:oleObj spid="_x0000_s202835" name="Equation" r:id="rId3" imgW="1396800" imgH="393480" progId="Equation.3">
+                <p:oleObj spid="_x0000_s202853" name="Equation" r:id="rId3" imgW="1396800" imgH="393480" progId="Equation.3">
                   <p:embed/>
                 </p:oleObj>
               </mc:Choice>
@@ -5085,7 +5164,7 @@
           <a:graphicData uri="http://schemas.openxmlformats.org/presentationml/2006/ole">
             <mc:AlternateContent xmlns:mc="http://schemas.openxmlformats.org/markup-compatibility/2006">
               <mc:Choice xmlns:v="urn:schemas-microsoft-com:vml" Requires="v">
-                <p:oleObj spid="_x0000_s202836" name="Equation" r:id="rId5" imgW="1714320" imgH="355320" progId="Equation.3">
+                <p:oleObj spid="_x0000_s202854" name="Equation" r:id="rId5" imgW="1714320" imgH="355320" progId="Equation.3">
                   <p:embed/>
                 </p:oleObj>
               </mc:Choice>
@@ -5147,7 +5226,7 @@
           <a:graphicData uri="http://schemas.openxmlformats.org/presentationml/2006/ole">
             <mc:AlternateContent xmlns:mc="http://schemas.openxmlformats.org/markup-compatibility/2006">
               <mc:Choice xmlns:v="urn:schemas-microsoft-com:vml" Requires="v">
-                <p:oleObj spid="_x0000_s202837" name="Equation" r:id="rId7" imgW="558720" imgH="152280" progId="Equation.3">
+                <p:oleObj spid="_x0000_s202855" name="Equation" r:id="rId7" imgW="558720" imgH="152280" progId="Equation.3">
                   <p:embed/>
                 </p:oleObj>
               </mc:Choice>
@@ -5209,7 +5288,7 @@
           <a:graphicData uri="http://schemas.openxmlformats.org/presentationml/2006/ole">
             <mc:AlternateContent xmlns:mc="http://schemas.openxmlformats.org/markup-compatibility/2006">
               <mc:Choice xmlns:v="urn:schemas-microsoft-com:vml" Requires="v">
-                <p:oleObj spid="_x0000_s202838" name="Equation" r:id="rId9" imgW="1307880" imgH="457200" progId="Equation.3">
+                <p:oleObj spid="_x0000_s202856" name="Equation" r:id="rId9" imgW="1307880" imgH="457200" progId="Equation.3">
                   <p:embed/>
                 </p:oleObj>
               </mc:Choice>
@@ -5271,7 +5350,7 @@
           <a:graphicData uri="http://schemas.openxmlformats.org/presentationml/2006/ole">
             <mc:AlternateContent xmlns:mc="http://schemas.openxmlformats.org/markup-compatibility/2006">
               <mc:Choice xmlns:v="urn:schemas-microsoft-com:vml" Requires="v">
-                <p:oleObj spid="_x0000_s202839" name="Equation" r:id="rId11" imgW="1168200" imgH="419040" progId="Equation.3">
+                <p:oleObj spid="_x0000_s202857" name="Equation" r:id="rId11" imgW="1168200" imgH="419040" progId="Equation.3">
                   <p:embed/>
                 </p:oleObj>
               </mc:Choice>
@@ -5333,7 +5412,7 @@
           <a:graphicData uri="http://schemas.openxmlformats.org/presentationml/2006/ole">
             <mc:AlternateContent xmlns:mc="http://schemas.openxmlformats.org/markup-compatibility/2006">
               <mc:Choice xmlns:v="urn:schemas-microsoft-com:vml" Requires="v">
-                <p:oleObj spid="_x0000_s202840" name="Equation" r:id="rId13" imgW="419040" imgH="152280" progId="Equation.3">
+                <p:oleObj spid="_x0000_s202858" name="Equation" r:id="rId13" imgW="419040" imgH="152280" progId="Equation.3">
                   <p:embed/>
                 </p:oleObj>
               </mc:Choice>
@@ -5395,7 +5474,7 @@
           <a:graphicData uri="http://schemas.openxmlformats.org/presentationml/2006/ole">
             <mc:AlternateContent xmlns:mc="http://schemas.openxmlformats.org/markup-compatibility/2006">
               <mc:Choice xmlns:v="urn:schemas-microsoft-com:vml" Requires="v">
-                <p:oleObj spid="_x0000_s202841" name="Equation" r:id="rId15" imgW="825480" imgH="419040" progId="Equation.3">
+                <p:oleObj spid="_x0000_s202859" name="Equation" r:id="rId15" imgW="825480" imgH="419040" progId="Equation.3">
                   <p:embed/>
                 </p:oleObj>
               </mc:Choice>
@@ -5457,7 +5536,7 @@
           <a:graphicData uri="http://schemas.openxmlformats.org/presentationml/2006/ole">
             <mc:AlternateContent xmlns:mc="http://schemas.openxmlformats.org/markup-compatibility/2006">
               <mc:Choice xmlns:v="urn:schemas-microsoft-com:vml" Requires="v">
-                <p:oleObj spid="_x0000_s202842" name="Equation" r:id="rId17" imgW="609480" imgH="330120" progId="Equation.3">
+                <p:oleObj spid="_x0000_s202860" name="Equation" r:id="rId17" imgW="609480" imgH="330120" progId="Equation.3">
                   <p:embed/>
                 </p:oleObj>
               </mc:Choice>
@@ -5519,7 +5598,7 @@
           <a:graphicData uri="http://schemas.openxmlformats.org/presentationml/2006/ole">
             <mc:AlternateContent xmlns:mc="http://schemas.openxmlformats.org/markup-compatibility/2006">
               <mc:Choice xmlns:v="urn:schemas-microsoft-com:vml" Requires="v">
-                <p:oleObj spid="_x0000_s202843" name="Equation" r:id="rId19" imgW="507960" imgH="152280" progId="Equation.3">
+                <p:oleObj spid="_x0000_s202861" name="Equation" r:id="rId19" imgW="507960" imgH="152280" progId="Equation.3">
                   <p:embed/>
                 </p:oleObj>
               </mc:Choice>
@@ -7967,7 +8046,7 @@
           <a:graphicData uri="http://schemas.openxmlformats.org/presentationml/2006/ole">
             <mc:AlternateContent xmlns:mc="http://schemas.openxmlformats.org/markup-compatibility/2006">
               <mc:Choice xmlns:v="urn:schemas-microsoft-com:vml" Requires="v">
-                <p:oleObj spid="_x0000_s199802" name="Equation" r:id="rId3" imgW="1511280" imgH="406080" progId="Equation.3">
+                <p:oleObj spid="_x0000_s199812" name="Equation" r:id="rId3" imgW="1511280" imgH="406080" progId="Equation.3">
                   <p:embed/>
                 </p:oleObj>
               </mc:Choice>
@@ -8080,7 +8159,7 @@
           <a:graphicData uri="http://schemas.openxmlformats.org/presentationml/2006/ole">
             <mc:AlternateContent xmlns:mc="http://schemas.openxmlformats.org/markup-compatibility/2006">
               <mc:Choice xmlns:v="urn:schemas-microsoft-com:vml" Requires="v">
-                <p:oleObj spid="_x0000_s199803" name="Equation" r:id="rId5" imgW="457200" imgH="215640" progId="Equation.3">
+                <p:oleObj spid="_x0000_s199813" name="Equation" r:id="rId5" imgW="457200" imgH="215640" progId="Equation.3">
                   <p:embed/>
                 </p:oleObj>
               </mc:Choice>
@@ -8242,7 +8321,7 @@
           <a:graphicData uri="http://schemas.openxmlformats.org/presentationml/2006/ole">
             <mc:AlternateContent xmlns:mc="http://schemas.openxmlformats.org/markup-compatibility/2006">
               <mc:Choice xmlns:v="urn:schemas-microsoft-com:vml" Requires="v">
-                <p:oleObj spid="_x0000_s199804" name="Equation" r:id="rId7" imgW="1130040" imgH="431640" progId="Equation.3">
+                <p:oleObj spid="_x0000_s199814" name="Equation" r:id="rId7" imgW="1130040" imgH="431640" progId="Equation.3">
                   <p:embed/>
                 </p:oleObj>
               </mc:Choice>
@@ -8318,7 +8397,7 @@
           <a:graphicData uri="http://schemas.openxmlformats.org/presentationml/2006/ole">
             <mc:AlternateContent xmlns:mc="http://schemas.openxmlformats.org/markup-compatibility/2006">
               <mc:Choice xmlns:v="urn:schemas-microsoft-com:vml" Requires="v">
-                <p:oleObj spid="_x0000_s199805" name="Equation" r:id="rId9" imgW="901440" imgH="520560" progId="Equation.3">
+                <p:oleObj spid="_x0000_s199815" name="Equation" r:id="rId9" imgW="901440" imgH="520560" progId="Equation.3">
                   <p:embed/>
                 </p:oleObj>
               </mc:Choice>
@@ -8620,7 +8699,7 @@
           <a:graphicData uri="http://schemas.openxmlformats.org/presentationml/2006/ole">
             <mc:AlternateContent xmlns:mc="http://schemas.openxmlformats.org/markup-compatibility/2006">
               <mc:Choice xmlns:v="urn:schemas-microsoft-com:vml" Requires="v">
-                <p:oleObj spid="_x0000_s199806" name="Equation" r:id="rId11" imgW="469800" imgH="215640" progId="Equation.3">
+                <p:oleObj spid="_x0000_s199816" name="Equation" r:id="rId11" imgW="469800" imgH="215640" progId="Equation.3">
                   <p:embed/>
                 </p:oleObj>
               </mc:Choice>

</xml_diff>